<commit_message>
improved formatting and TOC
</commit_message>
<xml_diff>
--- a/Courses/Software-Sciences/Module-1-OOP/03.2-Conditional-Statements-Advanced/03.2-Conditional-Statements-Advanced.pptx
+++ b/Courses/Software-Sciences/Module-1-OOP/03.2-Conditional-Statements-Advanced/03.2-Conditional-Statements-Advanced.pptx
@@ -313,7 +313,7 @@
           <a:p>
             <a:fld id="{4E087215-0C8F-4762-A664-737A353EC9A4}" type="datetimeFigureOut">
               <a:rPr lang="bg-BG" smtClean="0"/>
-              <a:t>4.05.23 г.</a:t>
+              <a:t>2.7.2023 г.</a:t>
             </a:fld>
             <a:endParaRPr lang="bg-BG" dirty="0"/>
           </a:p>
@@ -504,7 +504,7 @@
           <a:p>
             <a:fld id="{72D84649-876A-46C9-8472-14CB09C070D8}" type="datetimeFigureOut">
               <a:rPr lang="en-US" smtClean="0"/>
-              <a:t>5/4/23</a:t>
+              <a:t>2-Jul-23</a:t>
             </a:fld>
             <a:endParaRPr lang="en-US" dirty="0"/>
           </a:p>
@@ -19803,7 +19803,7 @@
         <p:spPr>
           <a:xfrm>
             <a:off x="381000" y="1384183"/>
-            <a:ext cx="9191820" cy="5207396"/>
+            <a:ext cx="9525000" cy="5207396"/>
           </a:xfrm>
         </p:spPr>
         <p:txBody>
@@ -19813,13 +19813,17 @@
           <a:lstStyle/>
           <a:p>
             <a:r>
+              <a:rPr lang="bg-BG" sz="3400" b="1" dirty="0"/>
+              <a:t>Живот</a:t>
+            </a:r>
+            <a:r>
               <a:rPr lang="bg-BG" sz="3400" dirty="0"/>
-              <a:t>Живот на променливите</a:t>
-            </a:r>
-          </a:p>
-          <a:p>
-            <a:r>
-              <a:rPr lang="bg-BG" sz="3400" dirty="0"/>
+              <a:t> на променливите (обхват на видимост)</a:t>
+            </a:r>
+          </a:p>
+          <a:p>
+            <a:r>
+              <a:rPr lang="bg-BG" sz="3400" b="1" dirty="0"/>
               <a:t>Вложени</a:t>
             </a:r>
             <a:r>
@@ -19834,20 +19838,52 @@
           <a:p>
             <a:r>
               <a:rPr lang="bg-BG" sz="3400" dirty="0"/>
-              <a:t>Логически оператори</a:t>
-            </a:r>
+              <a:t>Логически оператори: </a:t>
+            </a:r>
+            <a:r>
+              <a:rPr lang="en-US" sz="3400" b="1" dirty="0"/>
+              <a:t>AND</a:t>
+            </a:r>
+            <a:r>
+              <a:rPr lang="en-US" sz="3400" dirty="0"/>
+              <a:t> &amp;&amp;, </a:t>
+            </a:r>
+            <a:r>
+              <a:rPr lang="en-US" sz="3400" b="1" dirty="0"/>
+              <a:t>OR</a:t>
+            </a:r>
+            <a:r>
+              <a:rPr lang="en-US" sz="3400" dirty="0"/>
+              <a:t> ||, </a:t>
+            </a:r>
+            <a:r>
+              <a:rPr lang="en-US" sz="3400" b="1" dirty="0"/>
+              <a:t>NOT</a:t>
+            </a:r>
+            <a:r>
+              <a:rPr lang="en-US" sz="3400" dirty="0"/>
+              <a:t> !</a:t>
+            </a:r>
+            <a:endParaRPr lang="bg-BG" sz="3400" dirty="0"/>
           </a:p>
           <a:p>
             <a:r>
               <a:rPr lang="bg-BG" sz="3400" dirty="0"/>
               <a:t>Приоритет на условия</a:t>
             </a:r>
-          </a:p>
-          <a:p>
-            <a:pPr marL="442912" lvl="1" indent="0">
-              <a:buNone/>
-            </a:pPr>
-            <a:endParaRPr lang="bg-BG" dirty="0"/>
+            <a:r>
+              <a:rPr lang="en-US" sz="3400" dirty="0"/>
+              <a:t>: </a:t>
+            </a:r>
+            <a:r>
+              <a:rPr lang="bg-BG" sz="3400" dirty="0"/>
+              <a:t>скоби </a:t>
+            </a:r>
+            <a:r>
+              <a:rPr lang="en-US" sz="3400" b="1" dirty="0"/>
+              <a:t>()</a:t>
+            </a:r>
+            <a:endParaRPr lang="bg-BG" sz="3400" b="1" dirty="0"/>
           </a:p>
         </p:txBody>
       </p:sp>
@@ -27937,6 +27973,35 @@
       </p:pic>
       <p:sp>
         <p:nvSpPr>
+          <p:cNvPr id="3" name="Subtitle 2">
+            <a:extLst>
+              <a:ext uri="{FF2B5EF4-FFF2-40B4-BE49-F238E27FC236}">
+                <a16:creationId xmlns:a16="http://schemas.microsoft.com/office/drawing/2014/main" id="{7F2571D7-72D6-193F-3B2B-ECD219AE2448}"/>
+              </a:ext>
+            </a:extLst>
+          </p:cNvPr>
+          <p:cNvSpPr>
+            <a:spLocks noGrp="1"/>
+          </p:cNvSpPr>
+          <p:nvPr>
+            <p:ph type="subTitle" sz="quarter" idx="11"/>
+          </p:nvPr>
+        </p:nvSpPr>
+        <p:spPr/>
+        <p:txBody>
+          <a:bodyPr/>
+          <a:lstStyle/>
+          <a:p>
+            <a:r>
+              <a:rPr lang="bg-BG" sz="4000" dirty="0"/>
+              <a:t>Обхват, в който променливата е видима</a:t>
+            </a:r>
+            <a:endParaRPr lang="en-US" dirty="0"/>
+          </a:p>
+        </p:txBody>
+      </p:sp>
+      <p:sp>
+        <p:nvSpPr>
           <p:cNvPr id="5" name="Title 4">
             <a:extLst>
               <a:ext uri="{FF2B5EF4-FFF2-40B4-BE49-F238E27FC236}">
@@ -27951,7 +28016,12 @@
             <p:ph type="title" sz="quarter" idx="10"/>
           </p:nvPr>
         </p:nvSpPr>
-        <p:spPr/>
+        <p:spPr>
+          <a:xfrm>
+            <a:off x="615109" y="4704825"/>
+            <a:ext cx="10961783" cy="768084"/>
+          </a:xfrm>
+        </p:spPr>
         <p:txBody>
           <a:bodyPr/>
           <a:lstStyle/>

</xml_diff>